<commit_message>
Small corrections and updates to slides
</commit_message>
<xml_diff>
--- a/LectureSlides/03a_ReviewOfProbability.pptx
+++ b/LectureSlides/03a_ReviewOfProbability.pptx
@@ -349,7 +349,7 @@
           <a:p>
             <a:fld id="{241EB5C9-1307-BA42-ABA2-0BC069CD8E7F}" type="datetimeFigureOut">
               <a:rPr lang="en-US" smtClean="0"/>
-              <a:t>9/7/2024</a:t>
+              <a:t>9/8/2024</a:t>
             </a:fld>
             <a:endParaRPr lang="en-US"/>
           </a:p>
@@ -517,7 +517,7 @@
           <a:p>
             <a:fld id="{241EB5C9-1307-BA42-ABA2-0BC069CD8E7F}" type="datetimeFigureOut">
               <a:rPr lang="en-US" smtClean="0"/>
-              <a:t>9/7/2024</a:t>
+              <a:t>9/8/2024</a:t>
             </a:fld>
             <a:endParaRPr lang="en-US"/>
           </a:p>
@@ -695,7 +695,7 @@
           <a:p>
             <a:fld id="{241EB5C9-1307-BA42-ABA2-0BC069CD8E7F}" type="datetimeFigureOut">
               <a:rPr lang="en-US" smtClean="0"/>
-              <a:t>9/7/2024</a:t>
+              <a:t>9/8/2024</a:t>
             </a:fld>
             <a:endParaRPr lang="en-US"/>
           </a:p>
@@ -863,7 +863,7 @@
           <a:p>
             <a:fld id="{241EB5C9-1307-BA42-ABA2-0BC069CD8E7F}" type="datetimeFigureOut">
               <a:rPr lang="en-US" smtClean="0"/>
-              <a:t>9/7/2024</a:t>
+              <a:t>9/8/2024</a:t>
             </a:fld>
             <a:endParaRPr lang="en-US"/>
           </a:p>
@@ -1108,7 +1108,7 @@
           <a:p>
             <a:fld id="{241EB5C9-1307-BA42-ABA2-0BC069CD8E7F}" type="datetimeFigureOut">
               <a:rPr lang="en-US" smtClean="0"/>
-              <a:t>9/7/2024</a:t>
+              <a:t>9/8/2024</a:t>
             </a:fld>
             <a:endParaRPr lang="en-US"/>
           </a:p>
@@ -1393,7 +1393,7 @@
           <a:p>
             <a:fld id="{241EB5C9-1307-BA42-ABA2-0BC069CD8E7F}" type="datetimeFigureOut">
               <a:rPr lang="en-US" smtClean="0"/>
-              <a:t>9/7/2024</a:t>
+              <a:t>9/8/2024</a:t>
             </a:fld>
             <a:endParaRPr lang="en-US"/>
           </a:p>
@@ -1812,7 +1812,7 @@
           <a:p>
             <a:fld id="{241EB5C9-1307-BA42-ABA2-0BC069CD8E7F}" type="datetimeFigureOut">
               <a:rPr lang="en-US" smtClean="0"/>
-              <a:t>9/7/2024</a:t>
+              <a:t>9/8/2024</a:t>
             </a:fld>
             <a:endParaRPr lang="en-US"/>
           </a:p>
@@ -1929,7 +1929,7 @@
           <a:p>
             <a:fld id="{241EB5C9-1307-BA42-ABA2-0BC069CD8E7F}" type="datetimeFigureOut">
               <a:rPr lang="en-US" smtClean="0"/>
-              <a:t>9/7/2024</a:t>
+              <a:t>9/8/2024</a:t>
             </a:fld>
             <a:endParaRPr lang="en-US"/>
           </a:p>
@@ -2024,7 +2024,7 @@
           <a:p>
             <a:fld id="{241EB5C9-1307-BA42-ABA2-0BC069CD8E7F}" type="datetimeFigureOut">
               <a:rPr lang="en-US" smtClean="0"/>
-              <a:t>9/7/2024</a:t>
+              <a:t>9/8/2024</a:t>
             </a:fld>
             <a:endParaRPr lang="en-US"/>
           </a:p>
@@ -2299,7 +2299,7 @@
           <a:p>
             <a:fld id="{241EB5C9-1307-BA42-ABA2-0BC069CD8E7F}" type="datetimeFigureOut">
               <a:rPr lang="en-US" smtClean="0"/>
-              <a:t>9/7/2024</a:t>
+              <a:t>9/8/2024</a:t>
             </a:fld>
             <a:endParaRPr lang="en-US"/>
           </a:p>
@@ -2551,7 +2551,7 @@
           <a:p>
             <a:fld id="{241EB5C9-1307-BA42-ABA2-0BC069CD8E7F}" type="datetimeFigureOut">
               <a:rPr lang="en-US" smtClean="0"/>
-              <a:t>9/7/2024</a:t>
+              <a:t>9/8/2024</a:t>
             </a:fld>
             <a:endParaRPr lang="en-US"/>
           </a:p>
@@ -2762,7 +2762,7 @@
           <a:p>
             <a:fld id="{241EB5C9-1307-BA42-ABA2-0BC069CD8E7F}" type="datetimeFigureOut">
               <a:rPr lang="en-US" smtClean="0"/>
-              <a:t>9/7/2024</a:t>
+              <a:t>9/8/2024</a:t>
             </a:fld>
             <a:endParaRPr lang="en-US"/>
           </a:p>
@@ -3722,8 +3722,8 @@
           </a:p>
         </p:txBody>
       </p:sp>
-      <mc:AlternateContent xmlns:mc="http://schemas.openxmlformats.org/markup-compatibility/2006">
-        <mc:Choice xmlns:a14="http://schemas.microsoft.com/office/drawing/2010/main" Requires="a14">
+      <mc:AlternateContent xmlns:mc="http://schemas.openxmlformats.org/markup-compatibility/2006" xmlns:a14="http://schemas.microsoft.com/office/drawing/2010/main">
+        <mc:Choice Requires="a14">
           <p:sp>
             <p:nvSpPr>
               <p:cNvPr id="3" name="Content Placeholder 2"/>
@@ -4227,7 +4227,7 @@
             </p:txBody>
           </p:sp>
         </mc:Choice>
-        <mc:Fallback>
+        <mc:Fallback xmlns="">
           <p:sp>
             <p:nvSpPr>
               <p:cNvPr id="3" name="Content Placeholder 2"/>
@@ -4311,8 +4311,8 @@
           </a:p>
         </p:txBody>
       </p:sp>
-      <mc:AlternateContent xmlns:mc="http://schemas.openxmlformats.org/markup-compatibility/2006">
-        <mc:Choice xmlns:a14="http://schemas.microsoft.com/office/drawing/2010/main" Requires="a14">
+      <mc:AlternateContent xmlns:mc="http://schemas.openxmlformats.org/markup-compatibility/2006" xmlns:a14="http://schemas.microsoft.com/office/drawing/2010/main">
+        <mc:Choice Requires="a14">
           <p:sp>
             <p:nvSpPr>
               <p:cNvPr id="3" name="Content Placeholder 2"/>
@@ -4817,7 +4817,7 @@
             </p:txBody>
           </p:sp>
         </mc:Choice>
-        <mc:Fallback>
+        <mc:Fallback xmlns="">
           <p:sp>
             <p:nvSpPr>
               <p:cNvPr id="3" name="Content Placeholder 2"/>
@@ -5008,8 +5008,8 @@
           </a:p>
         </p:txBody>
       </p:sp>
-      <mc:AlternateContent xmlns:mc="http://schemas.openxmlformats.org/markup-compatibility/2006">
-        <mc:Choice xmlns:a14="http://schemas.microsoft.com/office/drawing/2010/main" Requires="a14">
+      <mc:AlternateContent xmlns:mc="http://schemas.openxmlformats.org/markup-compatibility/2006" xmlns:a14="http://schemas.microsoft.com/office/drawing/2010/main">
+        <mc:Choice Requires="a14">
           <p:sp>
             <p:nvSpPr>
               <p:cNvPr id="3" name="Content Placeholder 2"/>
@@ -5382,7 +5382,7 @@
             </p:txBody>
           </p:sp>
         </mc:Choice>
-        <mc:Fallback>
+        <mc:Fallback xmlns="">
           <p:sp>
             <p:nvSpPr>
               <p:cNvPr id="3" name="Content Placeholder 2"/>
@@ -6198,8 +6198,8 @@
           </a:p>
         </p:txBody>
       </p:sp>
-      <mc:AlternateContent xmlns:mc="http://schemas.openxmlformats.org/markup-compatibility/2006">
-        <mc:Choice xmlns:a14="http://schemas.microsoft.com/office/drawing/2010/main" Requires="a14">
+      <mc:AlternateContent xmlns:mc="http://schemas.openxmlformats.org/markup-compatibility/2006" xmlns:a14="http://schemas.microsoft.com/office/drawing/2010/main">
+        <mc:Choice Requires="a14">
           <p:sp>
             <p:nvSpPr>
               <p:cNvPr id="3" name="Content Placeholder 2"/>
@@ -6803,7 +6803,7 @@
             </p:txBody>
           </p:sp>
         </mc:Choice>
-        <mc:Fallback>
+        <mc:Fallback xmlns="">
           <p:sp>
             <p:nvSpPr>
               <p:cNvPr id="3" name="Content Placeholder 2"/>
@@ -6916,8 +6916,8 @@
           </a:prstGeom>
         </p:spPr>
       </p:pic>
-      <mc:AlternateContent xmlns:mc="http://schemas.openxmlformats.org/markup-compatibility/2006">
-        <mc:Choice xmlns:a14="http://schemas.microsoft.com/office/drawing/2010/main" Requires="a14">
+      <mc:AlternateContent xmlns:mc="http://schemas.openxmlformats.org/markup-compatibility/2006" xmlns:a14="http://schemas.microsoft.com/office/drawing/2010/main">
+        <mc:Choice Requires="a14">
           <p:sp>
             <p:nvSpPr>
               <p:cNvPr id="10" name="TextBox 9">
@@ -6962,13 +6962,7 @@
                       <a:rPr lang="en-US" sz="2200" b="0" i="1" smtClean="0">
                         <a:latin typeface="Cambria Math" panose="02040503050406030204" pitchFamily="18" charset="0"/>
                       </a:rPr>
-                      <m:t>=</m:t>
-                    </m:r>
-                    <m:r>
-                      <a:rPr lang="en-US" sz="2200" b="0" i="1" smtClean="0">
-                        <a:latin typeface="Cambria Math" panose="02040503050406030204" pitchFamily="18" charset="0"/>
-                      </a:rPr>
-                      <m:t>3</m:t>
+                      <m:t>=3</m:t>
                     </m:r>
                   </m:oMath>
                 </a14:m>
@@ -7257,7 +7251,7 @@
             </p:txBody>
           </p:sp>
         </mc:Choice>
-        <mc:Fallback>
+        <mc:Fallback xmlns="">
           <p:sp>
             <p:nvSpPr>
               <p:cNvPr id="10" name="TextBox 9">
@@ -7356,8 +7350,8 @@
           </a:p>
         </p:txBody>
       </p:sp>
-      <mc:AlternateContent xmlns:mc="http://schemas.openxmlformats.org/markup-compatibility/2006">
-        <mc:Choice xmlns:a14="http://schemas.microsoft.com/office/drawing/2010/main" Requires="a14">
+      <mc:AlternateContent xmlns:mc="http://schemas.openxmlformats.org/markup-compatibility/2006" xmlns:a14="http://schemas.microsoft.com/office/drawing/2010/main">
+        <mc:Choice Requires="a14">
           <p:sp>
             <p:nvSpPr>
               <p:cNvPr id="3" name="Content Placeholder 2"/>
@@ -7706,7 +7700,7 @@
             </p:txBody>
           </p:sp>
         </mc:Choice>
-        <mc:Fallback>
+        <mc:Fallback xmlns="">
           <p:sp>
             <p:nvSpPr>
               <p:cNvPr id="3" name="Content Placeholder 2"/>
@@ -7793,8 +7787,8 @@
           </a:p>
         </p:txBody>
       </p:sp>
-      <mc:AlternateContent xmlns:mc="http://schemas.openxmlformats.org/markup-compatibility/2006">
-        <mc:Choice xmlns:a14="http://schemas.microsoft.com/office/drawing/2010/main" Requires="a14">
+      <mc:AlternateContent xmlns:mc="http://schemas.openxmlformats.org/markup-compatibility/2006" xmlns:a14="http://schemas.microsoft.com/office/drawing/2010/main">
+        <mc:Choice Requires="a14">
           <p:sp>
             <p:nvSpPr>
               <p:cNvPr id="3" name="Content Placeholder 2"/>
@@ -7870,7 +7864,7 @@
             </p:txBody>
           </p:sp>
         </mc:Choice>
-        <mc:Fallback>
+        <mc:Fallback xmlns="">
           <p:sp>
             <p:nvSpPr>
               <p:cNvPr id="3" name="Content Placeholder 2"/>
@@ -8126,8 +8120,8 @@
           </a:p>
         </p:txBody>
       </p:sp>
-      <mc:AlternateContent xmlns:mc="http://schemas.openxmlformats.org/markup-compatibility/2006">
-        <mc:Choice xmlns:a14="http://schemas.microsoft.com/office/drawing/2010/main" Requires="a14">
+      <mc:AlternateContent xmlns:mc="http://schemas.openxmlformats.org/markup-compatibility/2006" xmlns:a14="http://schemas.microsoft.com/office/drawing/2010/main">
+        <mc:Choice Requires="a14">
           <p:sp>
             <p:nvSpPr>
               <p:cNvPr id="3" name="Content Placeholder 2"/>
@@ -8611,7 +8605,7 @@
             </p:txBody>
           </p:sp>
         </mc:Choice>
-        <mc:Fallback>
+        <mc:Fallback xmlns="">
           <p:sp>
             <p:nvSpPr>
               <p:cNvPr id="3" name="Content Placeholder 2"/>
@@ -9346,8 +9340,8 @@
           </a:p>
         </p:txBody>
       </p:sp>
-      <mc:AlternateContent xmlns:mc="http://schemas.openxmlformats.org/markup-compatibility/2006">
-        <mc:Choice xmlns:a14="http://schemas.microsoft.com/office/drawing/2010/main" Requires="a14">
+      <mc:AlternateContent xmlns:mc="http://schemas.openxmlformats.org/markup-compatibility/2006" xmlns:a14="http://schemas.microsoft.com/office/drawing/2010/main">
+        <mc:Choice Requires="a14">
           <p:sp>
             <p:nvSpPr>
               <p:cNvPr id="3" name="Content Placeholder 2"/>
@@ -9803,7 +9797,7 @@
             </p:txBody>
           </p:sp>
         </mc:Choice>
-        <mc:Fallback>
+        <mc:Fallback xmlns="">
           <p:sp>
             <p:nvSpPr>
               <p:cNvPr id="3" name="Content Placeholder 2"/>
@@ -10004,8 +9998,8 @@
           </a:p>
         </p:txBody>
       </p:sp>
-      <mc:AlternateContent xmlns:mc="http://schemas.openxmlformats.org/markup-compatibility/2006">
-        <mc:Choice xmlns:a14="http://schemas.microsoft.com/office/drawing/2010/main" Requires="a14">
+      <mc:AlternateContent xmlns:mc="http://schemas.openxmlformats.org/markup-compatibility/2006" xmlns:a14="http://schemas.microsoft.com/office/drawing/2010/main">
+        <mc:Choice Requires="a14">
           <p:sp>
             <p:nvSpPr>
               <p:cNvPr id="3" name="Content Placeholder 2"/>
@@ -10740,7 +10734,7 @@
             </p:txBody>
           </p:sp>
         </mc:Choice>
-        <mc:Fallback>
+        <mc:Fallback xmlns="">
           <p:sp>
             <p:nvSpPr>
               <p:cNvPr id="3" name="Content Placeholder 2"/>
@@ -16645,8 +16639,8 @@
           <a:chExt cx="0" cy="0"/>
         </a:xfrm>
       </p:grpSpPr>
-      <mc:AlternateContent xmlns:mc="http://schemas.openxmlformats.org/markup-compatibility/2006">
-        <mc:Choice xmlns:a14="http://schemas.microsoft.com/office/drawing/2010/main" Requires="a14">
+      <mc:AlternateContent xmlns:mc="http://schemas.openxmlformats.org/markup-compatibility/2006" xmlns:a14="http://schemas.microsoft.com/office/drawing/2010/main">
+        <mc:Choice Requires="a14">
           <p:sp>
             <p:nvSpPr>
               <p:cNvPr id="2" name="Title 1"/>
@@ -16715,7 +16709,7 @@
             </p:txBody>
           </p:sp>
         </mc:Choice>
-        <mc:Fallback>
+        <mc:Fallback xmlns="">
           <p:sp>
             <p:nvSpPr>
               <p:cNvPr id="2" name="Title 1"/>
@@ -18608,8 +18602,8 @@
           </a:p>
         </p:txBody>
       </p:sp>
-      <mc:AlternateContent xmlns:mc="http://schemas.openxmlformats.org/markup-compatibility/2006">
-        <mc:Choice xmlns:a14="http://schemas.microsoft.com/office/drawing/2010/main" Requires="a14">
+      <mc:AlternateContent xmlns:mc="http://schemas.openxmlformats.org/markup-compatibility/2006" xmlns:a14="http://schemas.microsoft.com/office/drawing/2010/main">
+        <mc:Choice Requires="a14">
           <p:sp>
             <p:nvSpPr>
               <p:cNvPr id="3" name="Content Placeholder 2"/>
@@ -18804,7 +18798,7 @@
             </p:txBody>
           </p:sp>
         </mc:Choice>
-        <mc:Fallback>
+        <mc:Fallback xmlns="">
           <p:sp>
             <p:nvSpPr>
               <p:cNvPr id="3" name="Content Placeholder 2"/>
@@ -21359,8 +21353,8 @@
           </a:p>
         </p:txBody>
       </p:sp>
-      <mc:AlternateContent xmlns:mc="http://schemas.openxmlformats.org/markup-compatibility/2006">
-        <mc:Choice xmlns:a14="http://schemas.microsoft.com/office/drawing/2010/main" Requires="a14">
+      <mc:AlternateContent xmlns:mc="http://schemas.openxmlformats.org/markup-compatibility/2006" xmlns:a14="http://schemas.microsoft.com/office/drawing/2010/main">
+        <mc:Choice Requires="a14">
           <p:sp>
             <p:nvSpPr>
               <p:cNvPr id="3" name="Content Placeholder 2"/>
@@ -21473,7 +21467,7 @@
             </p:txBody>
           </p:sp>
         </mc:Choice>
-        <mc:Fallback>
+        <mc:Fallback xmlns="">
           <p:sp>
             <p:nvSpPr>
               <p:cNvPr id="3" name="Content Placeholder 2"/>
@@ -23028,8 +23022,8 @@
           </a:p>
         </p:txBody>
       </p:sp>
-      <mc:AlternateContent xmlns:mc="http://schemas.openxmlformats.org/markup-compatibility/2006" xmlns:a14="http://schemas.microsoft.com/office/drawing/2010/main">
-        <mc:Choice Requires="a14">
+      <mc:AlternateContent xmlns:mc="http://schemas.openxmlformats.org/markup-compatibility/2006">
+        <mc:Choice xmlns:a14="http://schemas.microsoft.com/office/drawing/2010/main" Requires="a14">
           <p:sp>
             <p:nvSpPr>
               <p:cNvPr id="3" name="Content Placeholder 2"/>
@@ -23040,10 +23034,15 @@
                 <p:ph idx="1"/>
               </p:nvPr>
             </p:nvSpPr>
-            <p:spPr/>
+            <p:spPr>
+              <a:xfrm>
+                <a:off x="457200" y="1063230"/>
+                <a:ext cx="8229600" cy="3802684"/>
+              </a:xfrm>
+            </p:spPr>
             <p:txBody>
               <a:bodyPr>
-                <a:normAutofit fontScale="77500" lnSpcReduction="20000"/>
+                <a:normAutofit fontScale="85000" lnSpcReduction="10000"/>
               </a:bodyPr>
               <a:lstStyle/>
               <a:p>
@@ -23842,7 +23841,7 @@
             </p:txBody>
           </p:sp>
         </mc:Choice>
-        <mc:Fallback xmlns="">
+        <mc:Fallback>
           <p:sp>
             <p:nvSpPr>
               <p:cNvPr id="3" name="Content Placeholder 2"/>
@@ -23854,10 +23853,14 @@
               </p:nvPr>
             </p:nvSpPr>
             <p:spPr>
+              <a:xfrm>
+                <a:off x="457200" y="1063230"/>
+                <a:ext cx="8229600" cy="3802684"/>
+              </a:xfrm>
               <a:blipFill>
                 <a:blip r:embed="rId2"/>
                 <a:stretch>
-                  <a:fillRect l="-519" t="-2334"/>
+                  <a:fillRect l="-667" t="-1603"/>
                 </a:stretch>
               </a:blipFill>
             </p:spPr>
@@ -25109,8 +25112,8 @@
           </a:p>
         </p:txBody>
       </p:sp>
-      <mc:AlternateContent xmlns:mc="http://schemas.openxmlformats.org/markup-compatibility/2006">
-        <mc:Choice xmlns:a14="http://schemas.microsoft.com/office/drawing/2010/main" Requires="a14">
+      <mc:AlternateContent xmlns:mc="http://schemas.openxmlformats.org/markup-compatibility/2006" xmlns:a14="http://schemas.microsoft.com/office/drawing/2010/main">
+        <mc:Choice Requires="a14">
           <p:sp>
             <p:nvSpPr>
               <p:cNvPr id="3" name="Content Placeholder 2"/>
@@ -25461,7 +25464,7 @@
             </p:txBody>
           </p:sp>
         </mc:Choice>
-        <mc:Fallback>
+        <mc:Fallback xmlns="">
           <p:sp>
             <p:nvSpPr>
               <p:cNvPr id="3" name="Content Placeholder 2"/>
@@ -25740,13 +25743,7 @@
                         <a:rPr>
                           <a:latin typeface="Cambria Math" panose="02040503050406030204" pitchFamily="18" charset="0"/>
                         </a:rPr>
-                        <m:t>0</m:t>
-                      </m:r>
-                      <m:r>
-                        <a:rPr>
-                          <a:latin typeface="Cambria Math" panose="02040503050406030204" pitchFamily="18" charset="0"/>
-                        </a:rPr>
-                        <m:t>≤</m:t>
+                        <m:t>0≤</m:t>
                       </m:r>
                       <m:nary>
                         <m:naryPr>
@@ -25847,13 +25844,7 @@
                         <a:rPr>
                           <a:latin typeface="Cambria Math" panose="02040503050406030204" pitchFamily="18" charset="0"/>
                         </a:rPr>
-                        <m:t> ≤</m:t>
-                      </m:r>
-                      <m:r>
-                        <a:rPr>
-                          <a:latin typeface="Cambria Math" panose="02040503050406030204" pitchFamily="18" charset="0"/>
-                        </a:rPr>
-                        <m:t>1</m:t>
+                        <m:t> ≤1</m:t>
                       </m:r>
                     </m:oMath>
                   </m:oMathPara>
@@ -26017,13 +26008,7 @@
                         <a:rPr>
                           <a:latin typeface="Cambria Math" panose="02040503050406030204" pitchFamily="18" charset="0"/>
                         </a:rPr>
-                        <m:t>=</m:t>
-                      </m:r>
-                      <m:r>
-                        <a:rPr>
-                          <a:latin typeface="Cambria Math" panose="02040503050406030204" pitchFamily="18" charset="0"/>
-                        </a:rPr>
-                        <m:t>1</m:t>
+                        <m:t>=1</m:t>
                       </m:r>
                     </m:oMath>
                   </m:oMathPara>
@@ -26062,13 +26047,7 @@
                       <a:rPr>
                         <a:latin typeface="Cambria Math" panose="02040503050406030204" pitchFamily="18" charset="0"/>
                       </a:rPr>
-                      <m:t>−</m:t>
-                    </m:r>
-                    <m:r>
-                      <a:rPr>
-                        <a:latin typeface="Cambria Math" panose="02040503050406030204" pitchFamily="18" charset="0"/>
-                      </a:rPr>
-                      <m:t>∞</m:t>
+                      <m:t>−∞</m:t>
                     </m:r>
                   </m:oMath>
                 </a14:m>

</xml_diff>

<commit_message>
Small corrections to probability review slides
</commit_message>
<xml_diff>
--- a/LectureSlides/03a_ReviewOfProbability.pptx
+++ b/LectureSlides/03a_ReviewOfProbability.pptx
@@ -45,14 +45,13 @@
     <p:sldId id="313" r:id="rId39"/>
     <p:sldId id="314" r:id="rId40"/>
     <p:sldId id="316" r:id="rId41"/>
-    <p:sldId id="317" r:id="rId42"/>
-    <p:sldId id="318" r:id="rId43"/>
-    <p:sldId id="319" r:id="rId44"/>
-    <p:sldId id="320" r:id="rId45"/>
-    <p:sldId id="300" r:id="rId46"/>
-    <p:sldId id="301" r:id="rId47"/>
-    <p:sldId id="302" r:id="rId48"/>
-    <p:sldId id="303" r:id="rId49"/>
+    <p:sldId id="318" r:id="rId42"/>
+    <p:sldId id="319" r:id="rId43"/>
+    <p:sldId id="320" r:id="rId44"/>
+    <p:sldId id="300" r:id="rId45"/>
+    <p:sldId id="301" r:id="rId46"/>
+    <p:sldId id="302" r:id="rId47"/>
+    <p:sldId id="303" r:id="rId48"/>
   </p:sldIdLst>
   <p:sldSz cx="9144000" cy="5143500" type="screen16x9"/>
   <p:notesSz cx="6858000" cy="9144000"/>
@@ -349,7 +348,7 @@
           <a:p>
             <a:fld id="{241EB5C9-1307-BA42-ABA2-0BC069CD8E7F}" type="datetimeFigureOut">
               <a:rPr lang="en-US" smtClean="0"/>
-              <a:t>9/8/2024</a:t>
+              <a:t>9/12/2024</a:t>
             </a:fld>
             <a:endParaRPr lang="en-US"/>
           </a:p>
@@ -517,7 +516,7 @@
           <a:p>
             <a:fld id="{241EB5C9-1307-BA42-ABA2-0BC069CD8E7F}" type="datetimeFigureOut">
               <a:rPr lang="en-US" smtClean="0"/>
-              <a:t>9/8/2024</a:t>
+              <a:t>9/12/2024</a:t>
             </a:fld>
             <a:endParaRPr lang="en-US"/>
           </a:p>
@@ -695,7 +694,7 @@
           <a:p>
             <a:fld id="{241EB5C9-1307-BA42-ABA2-0BC069CD8E7F}" type="datetimeFigureOut">
               <a:rPr lang="en-US" smtClean="0"/>
-              <a:t>9/8/2024</a:t>
+              <a:t>9/12/2024</a:t>
             </a:fld>
             <a:endParaRPr lang="en-US"/>
           </a:p>
@@ -863,7 +862,7 @@
           <a:p>
             <a:fld id="{241EB5C9-1307-BA42-ABA2-0BC069CD8E7F}" type="datetimeFigureOut">
               <a:rPr lang="en-US" smtClean="0"/>
-              <a:t>9/8/2024</a:t>
+              <a:t>9/12/2024</a:t>
             </a:fld>
             <a:endParaRPr lang="en-US"/>
           </a:p>
@@ -1108,7 +1107,7 @@
           <a:p>
             <a:fld id="{241EB5C9-1307-BA42-ABA2-0BC069CD8E7F}" type="datetimeFigureOut">
               <a:rPr lang="en-US" smtClean="0"/>
-              <a:t>9/8/2024</a:t>
+              <a:t>9/12/2024</a:t>
             </a:fld>
             <a:endParaRPr lang="en-US"/>
           </a:p>
@@ -1393,7 +1392,7 @@
           <a:p>
             <a:fld id="{241EB5C9-1307-BA42-ABA2-0BC069CD8E7F}" type="datetimeFigureOut">
               <a:rPr lang="en-US" smtClean="0"/>
-              <a:t>9/8/2024</a:t>
+              <a:t>9/12/2024</a:t>
             </a:fld>
             <a:endParaRPr lang="en-US"/>
           </a:p>
@@ -1812,7 +1811,7 @@
           <a:p>
             <a:fld id="{241EB5C9-1307-BA42-ABA2-0BC069CD8E7F}" type="datetimeFigureOut">
               <a:rPr lang="en-US" smtClean="0"/>
-              <a:t>9/8/2024</a:t>
+              <a:t>9/12/2024</a:t>
             </a:fld>
             <a:endParaRPr lang="en-US"/>
           </a:p>
@@ -1929,7 +1928,7 @@
           <a:p>
             <a:fld id="{241EB5C9-1307-BA42-ABA2-0BC069CD8E7F}" type="datetimeFigureOut">
               <a:rPr lang="en-US" smtClean="0"/>
-              <a:t>9/8/2024</a:t>
+              <a:t>9/12/2024</a:t>
             </a:fld>
             <a:endParaRPr lang="en-US"/>
           </a:p>
@@ -2024,7 +2023,7 @@
           <a:p>
             <a:fld id="{241EB5C9-1307-BA42-ABA2-0BC069CD8E7F}" type="datetimeFigureOut">
               <a:rPr lang="en-US" smtClean="0"/>
-              <a:t>9/8/2024</a:t>
+              <a:t>9/12/2024</a:t>
             </a:fld>
             <a:endParaRPr lang="en-US"/>
           </a:p>
@@ -2299,7 +2298,7 @@
           <a:p>
             <a:fld id="{241EB5C9-1307-BA42-ABA2-0BC069CD8E7F}" type="datetimeFigureOut">
               <a:rPr lang="en-US" smtClean="0"/>
-              <a:t>9/8/2024</a:t>
+              <a:t>9/12/2024</a:t>
             </a:fld>
             <a:endParaRPr lang="en-US"/>
           </a:p>
@@ -2551,7 +2550,7 @@
           <a:p>
             <a:fld id="{241EB5C9-1307-BA42-ABA2-0BC069CD8E7F}" type="datetimeFigureOut">
               <a:rPr lang="en-US" smtClean="0"/>
-              <a:t>9/8/2024</a:t>
+              <a:t>9/12/2024</a:t>
             </a:fld>
             <a:endParaRPr lang="en-US"/>
           </a:p>
@@ -2762,7 +2761,7 @@
           <a:p>
             <a:fld id="{241EB5C9-1307-BA42-ABA2-0BC069CD8E7F}" type="datetimeFigureOut">
               <a:rPr lang="en-US" smtClean="0"/>
-              <a:t>9/8/2024</a:t>
+              <a:t>9/12/2024</a:t>
             </a:fld>
             <a:endParaRPr lang="en-US"/>
           </a:p>
@@ -6881,6 +6880,7 @@
               <a:buNone/>
             </a:pPr>
             <a:r>
+              <a:rPr dirty="0"/>
               <a:t>The Categorical distribution</a:t>
             </a:r>
           </a:p>
@@ -6916,8 +6916,8 @@
           </a:prstGeom>
         </p:spPr>
       </p:pic>
-      <mc:AlternateContent xmlns:mc="http://schemas.openxmlformats.org/markup-compatibility/2006" xmlns:a14="http://schemas.microsoft.com/office/drawing/2010/main">
-        <mc:Choice Requires="a14">
+      <mc:AlternateContent xmlns:mc="http://schemas.openxmlformats.org/markup-compatibility/2006">
+        <mc:Choice xmlns:a14="http://schemas.microsoft.com/office/drawing/2010/main" Requires="a14">
           <p:sp>
             <p:nvSpPr>
               <p:cNvPr id="10" name="TextBox 9">
@@ -6962,7 +6962,13 @@
                       <a:rPr lang="en-US" sz="2200" b="0" i="1" smtClean="0">
                         <a:latin typeface="Cambria Math" panose="02040503050406030204" pitchFamily="18" charset="0"/>
                       </a:rPr>
-                      <m:t>=3</m:t>
+                      <m:t>=</m:t>
+                    </m:r>
+                    <m:r>
+                      <a:rPr lang="en-US" sz="2200" b="0" i="1" smtClean="0">
+                        <a:latin typeface="Cambria Math" panose="02040503050406030204" pitchFamily="18" charset="0"/>
+                      </a:rPr>
+                      <m:t>3</m:t>
                     </m:r>
                   </m:oMath>
                 </a14:m>
@@ -6996,15 +7002,7 @@
                 </a:pPr>
                 <a:r>
                   <a:rPr lang="en-US" sz="2200" dirty="0"/>
-                  <a:t>The probabilities of </a:t>
-                </a:r>
-                <a:r>
-                  <a:rPr lang="en-US" sz="2200" dirty="0" err="1"/>
-                  <a:t>of</a:t>
-                </a:r>
-                <a:r>
-                  <a:rPr lang="en-US" sz="2200" dirty="0"/>
-                  <a:t> each outcome is </a:t>
+                  <a:t>The expected outcomes are </a:t>
                 </a:r>
                 <a14:m>
                   <m:oMath xmlns:m="http://schemas.openxmlformats.org/officeDocument/2006/math">
@@ -7251,7 +7249,7 @@
             </p:txBody>
           </p:sp>
         </mc:Choice>
-        <mc:Fallback xmlns="">
+        <mc:Fallback>
           <p:sp>
             <p:nvSpPr>
               <p:cNvPr id="10" name="TextBox 9">
@@ -10821,8 +10819,8 @@
           </a:p>
         </p:txBody>
       </p:sp>
-      <mc:AlternateContent xmlns:mc="http://schemas.openxmlformats.org/markup-compatibility/2006" xmlns:a14="http://schemas.microsoft.com/office/drawing/2010/main">
-        <mc:Choice Requires="a14">
+      <mc:AlternateContent xmlns:mc="http://schemas.openxmlformats.org/markup-compatibility/2006">
+        <mc:Choice xmlns:a14="http://schemas.microsoft.com/office/drawing/2010/main" Requires="a14">
           <p:sp>
             <p:nvSpPr>
               <p:cNvPr id="3" name="Content Placeholder 2"/>
@@ -12193,6 +12191,43 @@
                             </a:rPr>
                             <m:t>−</m:t>
                           </m:r>
+                          <m:acc>
+                            <m:accPr>
+                              <m:chr m:val="̅"/>
+                              <m:ctrlPr>
+                                <a:rPr lang="en-US" i="1">
+                                  <a:latin typeface="Cambria Math" panose="02040503050406030204" pitchFamily="18" charset="0"/>
+                                </a:rPr>
+                              </m:ctrlPr>
+                            </m:accPr>
+                            <m:e>
+                              <m:sSub>
+                                <m:sSubPr>
+                                  <m:ctrlPr>
+                                    <a:rPr lang="en-US" i="1" smtClean="0">
+                                      <a:latin typeface="Cambria Math" panose="02040503050406030204" pitchFamily="18" charset="0"/>
+                                    </a:rPr>
+                                  </m:ctrlPr>
+                                </m:sSubPr>
+                                <m:e>
+                                  <m:r>
+                                    <a:rPr lang="en-US" i="1">
+                                      <a:latin typeface="Cambria Math" panose="02040503050406030204" pitchFamily="18" charset="0"/>
+                                    </a:rPr>
+                                    <m:t>𝑥</m:t>
+                                  </m:r>
+                                </m:e>
+                                <m:sub>
+                                  <m:r>
+                                    <a:rPr lang="en-US" b="0" i="1" smtClean="0">
+                                      <a:latin typeface="Cambria Math" panose="02040503050406030204" pitchFamily="18" charset="0"/>
+                                    </a:rPr>
+                                    <m:t>𝑗</m:t>
+                                  </m:r>
+                                </m:sub>
+                              </m:sSub>
+                            </m:e>
+                          </m:acc>
                         </m:e>
                       </m:d>
                     </m:oMath>
@@ -12321,7 +12356,7 @@
             </p:txBody>
           </p:sp>
         </mc:Choice>
-        <mc:Fallback xmlns="">
+        <mc:Fallback>
           <p:sp>
             <p:nvSpPr>
               <p:cNvPr id="3" name="Content Placeholder 2"/>
@@ -15149,7 +15184,7 @@
                       <m:f>
                         <m:fPr>
                           <m:ctrlPr>
-                            <a:rPr lang="ar-AE" i="1">
+                            <a:rPr lang="ar-AE" i="1" smtClean="0">
                               <a:latin typeface="Cambria Math" panose="02040503050406030204" pitchFamily="18" charset="0"/>
                             </a:rPr>
                           </m:ctrlPr>
@@ -15164,7 +15199,7 @@
                         </m:num>
                         <m:den>
                           <m:r>
-                            <a:rPr lang="ar-AE">
+                            <a:rPr lang="ar-AE" smtClean="0">
                               <a:latin typeface="Cambria Math" panose="02040503050406030204" pitchFamily="18" charset="0"/>
                             </a:rPr>
                             <m:t>𝑥</m:t>
@@ -15555,8 +15590,8 @@
           </a:p>
         </p:txBody>
       </p:sp>
-      <mc:AlternateContent xmlns:mc="http://schemas.openxmlformats.org/markup-compatibility/2006" xmlns:a14="http://schemas.microsoft.com/office/drawing/2010/main">
-        <mc:Choice Requires="a14">
+      <mc:AlternateContent xmlns:mc="http://schemas.openxmlformats.org/markup-compatibility/2006">
+        <mc:Choice xmlns:a14="http://schemas.microsoft.com/office/drawing/2010/main" Requires="a14">
           <p:sp>
             <p:nvSpPr>
               <p:cNvPr id="3" name="Content Placeholder 2"/>
@@ -15618,7 +15653,7 @@
                 <a:pPr lvl="0"/>
                 <a:r>
                   <a:rPr lang="en-US" dirty="0"/>
-                  <a:t>The PDF of the t-distribution is a rather complex looking result:</a:t>
+                  <a:t>The PDF of the t-distribution is rather complex looking:</a:t>
                 </a:r>
               </a:p>
               <a:p>
@@ -16057,7 +16092,7 @@
             </p:txBody>
           </p:sp>
         </mc:Choice>
-        <mc:Fallback xmlns="">
+        <mc:Fallback>
           <p:sp>
             <p:nvSpPr>
               <p:cNvPr id="3" name="Content Placeholder 2"/>
@@ -16441,8 +16476,8 @@
           </p:sp>
         </mc:Fallback>
       </mc:AlternateContent>
-      <mc:AlternateContent xmlns:mc="http://schemas.openxmlformats.org/markup-compatibility/2006" xmlns:a14="http://schemas.microsoft.com/office/drawing/2010/main">
-        <mc:Choice Requires="a14">
+      <mc:AlternateContent xmlns:mc="http://schemas.openxmlformats.org/markup-compatibility/2006">
+        <mc:Choice xmlns:a14="http://schemas.microsoft.com/office/drawing/2010/main" Requires="a14">
           <p:sp>
             <p:nvSpPr>
               <p:cNvPr id="3" name="Title 1">
@@ -16563,13 +16598,13 @@
                 </a:pPr>
                 <a:r>
                   <a:rPr lang="en-US" sz="2400" dirty="0"/>
-                  <a:t>Gamma family are used in problems, ranging from measurements of physical systems to hypothesis testing</a:t>
+                  <a:t>Gamma family is used for problems, ranging from measurements of physical systems to hypothesis testing</a:t>
                 </a:r>
               </a:p>
             </p:txBody>
           </p:sp>
         </mc:Choice>
-        <mc:Fallback xmlns="">
+        <mc:Fallback>
           <p:sp>
             <p:nvSpPr>
               <p:cNvPr id="3" name="Title 1">
@@ -16743,8 +16778,8 @@
           </p:sp>
         </mc:Fallback>
       </mc:AlternateContent>
-      <mc:AlternateContent xmlns:mc="http://schemas.openxmlformats.org/markup-compatibility/2006" xmlns:a14="http://schemas.microsoft.com/office/drawing/2010/main">
-        <mc:Choice Requires="a14">
+      <mc:AlternateContent xmlns:mc="http://schemas.openxmlformats.org/markup-compatibility/2006">
+        <mc:Choice xmlns:a14="http://schemas.microsoft.com/office/drawing/2010/main" Requires="a14">
           <p:sp>
             <p:nvSpPr>
               <p:cNvPr id="3" name="Content Placeholder 2"/>
@@ -16767,7 +16802,7 @@
                 </a:pPr>
                 <a:r>
                   <a:rPr lang="en-US" dirty="0"/>
-                  <a:t>Gamma family can be parameterized in several ways; we will use:  </a:t>
+                  <a:t>Gamma family can be parameterized in several ways; we will use the following:  </a:t>
                 </a:r>
               </a:p>
               <a:p>
@@ -17289,7 +17324,7 @@
             </p:txBody>
           </p:sp>
         </mc:Choice>
-        <mc:Fallback xmlns="">
+        <mc:Fallback>
           <p:sp>
             <p:nvSpPr>
               <p:cNvPr id="3" name="Content Placeholder 2"/>
@@ -17304,7 +17339,7 @@
               <a:blipFill>
                 <a:blip r:embed="rId3"/>
                 <a:stretch>
-                  <a:fillRect l="-1111" t="-1436" b="-180"/>
+                  <a:fillRect l="-1111" t="-1436" r="-222" b="-180"/>
                 </a:stretch>
               </a:blipFill>
             </p:spPr>
@@ -17453,8 +17488,8 @@
           </p:sp>
         </mc:Fallback>
       </mc:AlternateContent>
-      <mc:AlternateContent xmlns:mc="http://schemas.openxmlformats.org/markup-compatibility/2006" xmlns:a14="http://schemas.microsoft.com/office/drawing/2010/main">
-        <mc:Choice Requires="a14">
+      <mc:AlternateContent xmlns:mc="http://schemas.openxmlformats.org/markup-compatibility/2006">
+        <mc:Choice xmlns:a14="http://schemas.microsoft.com/office/drawing/2010/main" Requires="a14">
           <p:sp>
             <p:nvSpPr>
               <p:cNvPr id="3" name="Content Placeholder 2"/>
@@ -17465,10 +17500,15 @@
                 <p:ph idx="1"/>
               </p:nvPr>
             </p:nvSpPr>
-            <p:spPr/>
+            <p:spPr>
+              <a:xfrm>
+                <a:off x="457200" y="1200151"/>
+                <a:ext cx="8229600" cy="3567792"/>
+              </a:xfrm>
+            </p:spPr>
             <p:txBody>
               <a:bodyPr>
-                <a:normAutofit fontScale="85000" lnSpcReduction="10000"/>
+                <a:normAutofit fontScale="92500" lnSpcReduction="10000"/>
               </a:bodyPr>
               <a:lstStyle/>
               <a:p>
@@ -17477,7 +17517,7 @@
                 </a:pPr>
                 <a:r>
                   <a:rPr lang="en-US" dirty="0"/>
-                  <a:t>Two useful special cases of the Gamma distribution are:    - </a:t>
+                  <a:t>Two useful special cases of the Gamma distribution are:   </a:t>
                 </a:r>
               </a:p>
               <a:p>
@@ -17866,13 +17906,6 @@
                 <a:r>
                   <a:rPr lang="en-US" dirty="0"/>
                   <a:t>distribution has many uses in statistics</a:t>
-                </a:r>
-              </a:p>
-              <a:p>
-                <a:pPr lvl="1"/>
-                <a:r>
-                  <a:rPr lang="en-US" dirty="0"/>
-                  <a:t>Used for estimates of the variance of the Normal distribution     </a:t>
                 </a:r>
               </a:p>
               <a:p>
@@ -18263,7 +18296,7 @@
             </p:txBody>
           </p:sp>
         </mc:Choice>
-        <mc:Fallback xmlns="">
+        <mc:Fallback>
           <p:sp>
             <p:nvSpPr>
               <p:cNvPr id="3" name="Content Placeholder 2"/>
@@ -18275,10 +18308,14 @@
               </p:nvPr>
             </p:nvSpPr>
             <p:spPr>
+              <a:xfrm>
+                <a:off x="457200" y="1200151"/>
+                <a:ext cx="8229600" cy="3567792"/>
+              </a:xfrm>
               <a:blipFill>
                 <a:blip r:embed="rId3"/>
                 <a:stretch>
-                  <a:fillRect l="-741" t="-1975" r="-370"/>
+                  <a:fillRect l="-963" t="-2222"/>
                 </a:stretch>
               </a:blipFill>
             </p:spPr>
@@ -18957,8 +18994,8 @@
           </p:sp>
         </mc:Fallback>
       </mc:AlternateContent>
-      <mc:AlternateContent xmlns:mc="http://schemas.openxmlformats.org/markup-compatibility/2006" xmlns:a14="http://schemas.microsoft.com/office/drawing/2010/main">
-        <mc:Choice Requires="a14">
+      <mc:AlternateContent xmlns:mc="http://schemas.openxmlformats.org/markup-compatibility/2006">
+        <mc:Choice xmlns:a14="http://schemas.microsoft.com/office/drawing/2010/main" Requires="a14">
           <p:sp>
             <p:nvSpPr>
               <p:cNvPr id="3" name="Content Placeholder 2"/>
@@ -19040,11 +19077,23 @@
                       </a:rPr>
                       <m:t>𝑛</m:t>
                     </m:r>
+                    <m:r>
+                      <a:rPr lang="en-US" b="0" i="1" smtClean="0">
+                        <a:latin typeface="Cambria Math" panose="02040503050406030204" pitchFamily="18" charset="0"/>
+                      </a:rPr>
+                      <m:t>−</m:t>
+                    </m:r>
+                    <m:r>
+                      <a:rPr lang="en-US" b="0" i="1" smtClean="0">
+                        <a:latin typeface="Cambria Math" panose="02040503050406030204" pitchFamily="18" charset="0"/>
+                      </a:rPr>
+                      <m:t>1</m:t>
+                    </m:r>
                   </m:oMath>
                 </a14:m>
                 <a:r>
                   <a:rPr lang="en-US" dirty="0"/>
-                  <a:t>,number of possible outcomes – 1</a:t>
+                  <a:t>, number of possible outcomes – 1</a:t>
                 </a:r>
               </a:p>
               <a:p>
@@ -19291,31 +19340,58 @@
                           </m:r>
                         </m:sup>
                         <m:e>
-                          <m:sSub>
-                            <m:sSubPr>
+                          <m:sSup>
+                            <m:sSupPr>
                               <m:ctrlPr>
-                                <a:rPr lang="en-US" i="1">
+                                <a:rPr lang="en-US" b="0" i="1" smtClean="0">
                                   <a:latin typeface="Cambria Math" panose="02040503050406030204" pitchFamily="18" charset="0"/>
                                 </a:rPr>
                               </m:ctrlPr>
-                            </m:sSubPr>
+                            </m:sSupPr>
                             <m:e>
-                              <m:r>
-                                <a:rPr lang="en-US" i="1">
-                                  <a:latin typeface="Cambria Math" panose="02040503050406030204" pitchFamily="18" charset="0"/>
-                                </a:rPr>
-                                <m:t>𝑧</m:t>
-                              </m:r>
+                              <m:sSubSup>
+                                <m:sSubSupPr>
+                                  <m:ctrlPr>
+                                    <a:rPr lang="en-US" i="1">
+                                      <a:latin typeface="Cambria Math" panose="02040503050406030204" pitchFamily="18" charset="0"/>
+                                    </a:rPr>
+                                  </m:ctrlPr>
+                                </m:sSubSupPr>
+                                <m:e>
+                                  <m:r>
+                                    <a:rPr lang="en-US" i="1">
+                                      <a:latin typeface="Cambria Math" panose="02040503050406030204" pitchFamily="18" charset="0"/>
+                                    </a:rPr>
+                                    <m:t>𝑧</m:t>
+                                  </m:r>
+                                </m:e>
+                                <m:sub>
+                                  <m:r>
+                                    <a:rPr lang="en-US" i="1">
+                                      <a:latin typeface="Cambria Math" panose="02040503050406030204" pitchFamily="18" charset="0"/>
+                                    </a:rPr>
+                                    <m:t>𝑖</m:t>
+                                  </m:r>
+                                </m:sub>
+                                <m:sup>
+                                  <m:r>
+                                    <a:rPr lang="en-US" i="1">
+                                      <a:latin typeface="Cambria Math" panose="02040503050406030204" pitchFamily="18" charset="0"/>
+                                    </a:rPr>
+                                    <m:t>2</m:t>
+                                  </m:r>
+                                </m:sup>
+                              </m:sSubSup>
                             </m:e>
-                            <m:sub>
+                            <m:sup>
                               <m:r>
                                 <a:rPr lang="en-US" b="0" i="1" smtClean="0">
                                   <a:latin typeface="Cambria Math" panose="02040503050406030204" pitchFamily="18" charset="0"/>
                                 </a:rPr>
-                                <m:t>𝑖</m:t>
+                                <m:t> </m:t>
                               </m:r>
-                            </m:sub>
-                          </m:sSub>
+                            </m:sup>
+                          </m:sSup>
                         </m:e>
                       </m:nary>
                     </m:oMath>
@@ -19505,7 +19581,7 @@
             </p:txBody>
           </p:sp>
         </mc:Choice>
-        <mc:Fallback xmlns="">
+        <mc:Fallback>
           <p:sp>
             <p:nvSpPr>
               <p:cNvPr id="3" name="Content Placeholder 2"/>
@@ -19681,718 +19757,6 @@
                 <p:ph idx="1"/>
               </p:nvPr>
             </p:nvSpPr>
-            <p:spPr/>
-            <p:txBody>
-              <a:bodyPr>
-                <a:normAutofit fontScale="92500" lnSpcReduction="10000"/>
-              </a:bodyPr>
-              <a:lstStyle/>
-              <a:p>
-                <a:pPr marL="0" indent="0">
-                  <a:buNone/>
-                </a:pPr>
-                <a:r>
-                  <a:rPr lang="en-US" dirty="0"/>
-                  <a:t>The </a:t>
-                </a:r>
-                <a14:m>
-                  <m:oMath xmlns:m="http://schemas.openxmlformats.org/officeDocument/2006/math">
-                    <m:sSup>
-                      <m:sSupPr>
-                        <m:ctrlPr>
-                          <a:rPr lang="en-US" i="1" smtClean="0">
-                            <a:latin typeface="Cambria Math" panose="02040503050406030204" pitchFamily="18" charset="0"/>
-                          </a:rPr>
-                        </m:ctrlPr>
-                      </m:sSupPr>
-                      <m:e>
-                        <m:r>
-                          <m:rPr>
-                            <m:sty m:val="p"/>
-                          </m:rPr>
-                          <a:rPr lang="el-GR" i="1" smtClean="0">
-                            <a:latin typeface="Cambria Math" panose="02040503050406030204" pitchFamily="18" charset="0"/>
-                            <a:ea typeface="Cambria Math" panose="02040503050406030204" pitchFamily="18" charset="0"/>
-                          </a:rPr>
-                          <m:t>Χ</m:t>
-                        </m:r>
-                      </m:e>
-                      <m:sup>
-                        <m:r>
-                          <a:rPr lang="en-US" b="0" i="1" smtClean="0">
-                            <a:latin typeface="Cambria Math" panose="02040503050406030204" pitchFamily="18" charset="0"/>
-                          </a:rPr>
-                          <m:t>2</m:t>
-                        </m:r>
-                      </m:sup>
-                    </m:sSup>
-                  </m:oMath>
-                </a14:m>
-                <a:r>
-                  <a:rPr lang="en-US" dirty="0"/>
-                  <a:t> distribution is a parametric distribution with a single parameter, the degrees of freedom, </a:t>
-                </a:r>
-                <a14:m>
-                  <m:oMath xmlns:m="http://schemas.openxmlformats.org/officeDocument/2006/math">
-                    <m:r>
-                      <a:rPr lang="en-US" b="0" i="1" smtClean="0">
-                        <a:latin typeface="Cambria Math" panose="02040503050406030204" pitchFamily="18" charset="0"/>
-                      </a:rPr>
-                      <m:t>𝑘</m:t>
-                    </m:r>
-                    <m:r>
-                      <a:rPr lang="en-US" b="0" i="1" smtClean="0">
-                        <a:latin typeface="Cambria Math" panose="02040503050406030204" pitchFamily="18" charset="0"/>
-                      </a:rPr>
-                      <m:t>=</m:t>
-                    </m:r>
-                    <m:r>
-                      <a:rPr lang="en-US" b="0" i="1" smtClean="0">
-                        <a:latin typeface="Cambria Math" panose="02040503050406030204" pitchFamily="18" charset="0"/>
-                      </a:rPr>
-                      <m:t>𝑛</m:t>
-                    </m:r>
-                  </m:oMath>
-                </a14:m>
-                <a:r>
-                  <a:rPr lang="en-US" dirty="0"/>
-                  <a:t>,number of possible outcomes – 1</a:t>
-                </a:r>
-              </a:p>
-              <a:p>
-                <a:r>
-                  <a:rPr lang="en-US" dirty="0"/>
-                  <a:t>For </a:t>
-                </a:r>
-                <a:r>
-                  <a:rPr lang="en-US" i="1" dirty="0"/>
-                  <a:t>n</a:t>
-                </a:r>
-                <a:r>
-                  <a:rPr lang="en-US" dirty="0"/>
-                  <a:t> </a:t>
-                </a:r>
-                <a:r>
-                  <a:rPr lang="en-US" dirty="0" err="1"/>
-                  <a:t>iid</a:t>
-                </a:r>
-                <a:r>
-                  <a:rPr lang="en-US" dirty="0"/>
-                  <a:t>  Normal random variables, </a:t>
-                </a:r>
-                <a14:m>
-                  <m:oMath xmlns:m="http://schemas.openxmlformats.org/officeDocument/2006/math">
-                    <m:sSub>
-                      <m:sSubPr>
-                        <m:ctrlPr>
-                          <a:rPr lang="en-US" i="1" smtClean="0">
-                            <a:latin typeface="Cambria Math" panose="02040503050406030204" pitchFamily="18" charset="0"/>
-                          </a:rPr>
-                        </m:ctrlPr>
-                      </m:sSubPr>
-                      <m:e>
-                        <m:r>
-                          <a:rPr lang="en-US" b="0" i="1" smtClean="0">
-                            <a:latin typeface="Cambria Math" panose="02040503050406030204" pitchFamily="18" charset="0"/>
-                          </a:rPr>
-                          <m:t>𝑧</m:t>
-                        </m:r>
-                      </m:e>
-                      <m:sub>
-                        <m:r>
-                          <a:rPr lang="en-US" b="0" i="1" smtClean="0">
-                            <a:latin typeface="Cambria Math" panose="02040503050406030204" pitchFamily="18" charset="0"/>
-                          </a:rPr>
-                          <m:t>1</m:t>
-                        </m:r>
-                      </m:sub>
-                    </m:sSub>
-                    <m:r>
-                      <a:rPr lang="en-US" b="0" i="1" smtClean="0">
-                        <a:latin typeface="Cambria Math" panose="02040503050406030204" pitchFamily="18" charset="0"/>
-                      </a:rPr>
-                      <m:t>,</m:t>
-                    </m:r>
-                    <m:sSub>
-                      <m:sSubPr>
-                        <m:ctrlPr>
-                          <a:rPr lang="en-US" i="1">
-                            <a:latin typeface="Cambria Math" panose="02040503050406030204" pitchFamily="18" charset="0"/>
-                          </a:rPr>
-                        </m:ctrlPr>
-                      </m:sSubPr>
-                      <m:e>
-                        <m:r>
-                          <a:rPr lang="en-US" i="1">
-                            <a:latin typeface="Cambria Math" panose="02040503050406030204" pitchFamily="18" charset="0"/>
-                          </a:rPr>
-                          <m:t>𝑧</m:t>
-                        </m:r>
-                      </m:e>
-                      <m:sub>
-                        <m:r>
-                          <a:rPr lang="en-US" b="0" i="1" smtClean="0">
-                            <a:latin typeface="Cambria Math" panose="02040503050406030204" pitchFamily="18" charset="0"/>
-                          </a:rPr>
-                          <m:t>2</m:t>
-                        </m:r>
-                      </m:sub>
-                    </m:sSub>
-                    <m:r>
-                      <a:rPr lang="en-US" i="1">
-                        <a:latin typeface="Cambria Math" panose="02040503050406030204" pitchFamily="18" charset="0"/>
-                      </a:rPr>
-                      <m:t>,</m:t>
-                    </m:r>
-                  </m:oMath>
-                </a14:m>
-                <a:r>
-                  <a:rPr lang="en-US" dirty="0"/>
-                  <a:t> </a:t>
-                </a:r>
-                <a14:m>
-                  <m:oMath xmlns:m="http://schemas.openxmlformats.org/officeDocument/2006/math">
-                    <m:sSub>
-                      <m:sSubPr>
-                        <m:ctrlPr>
-                          <a:rPr lang="en-US" i="1">
-                            <a:latin typeface="Cambria Math" panose="02040503050406030204" pitchFamily="18" charset="0"/>
-                          </a:rPr>
-                        </m:ctrlPr>
-                      </m:sSubPr>
-                      <m:e>
-                        <m:r>
-                          <a:rPr lang="en-US" i="1">
-                            <a:latin typeface="Cambria Math" panose="02040503050406030204" pitchFamily="18" charset="0"/>
-                          </a:rPr>
-                          <m:t>𝑧</m:t>
-                        </m:r>
-                      </m:e>
-                      <m:sub>
-                        <m:r>
-                          <a:rPr lang="en-US" b="0" i="1" smtClean="0">
-                            <a:latin typeface="Cambria Math" panose="02040503050406030204" pitchFamily="18" charset="0"/>
-                          </a:rPr>
-                          <m:t>3</m:t>
-                        </m:r>
-                      </m:sub>
-                    </m:sSub>
-                    <m:r>
-                      <a:rPr lang="en-US" i="1">
-                        <a:latin typeface="Cambria Math" panose="02040503050406030204" pitchFamily="18" charset="0"/>
-                      </a:rPr>
-                      <m:t>,</m:t>
-                    </m:r>
-                  </m:oMath>
-                </a14:m>
-                <a:r>
-                  <a:rPr lang="en-US" dirty="0"/>
-                  <a:t> …, </a:t>
-                </a:r>
-                <a14:m>
-                  <m:oMath xmlns:m="http://schemas.openxmlformats.org/officeDocument/2006/math">
-                    <m:sSub>
-                      <m:sSubPr>
-                        <m:ctrlPr>
-                          <a:rPr lang="en-US" i="1">
-                            <a:latin typeface="Cambria Math" panose="02040503050406030204" pitchFamily="18" charset="0"/>
-                          </a:rPr>
-                        </m:ctrlPr>
-                      </m:sSubPr>
-                      <m:e>
-                        <m:r>
-                          <a:rPr lang="en-US" i="1">
-                            <a:latin typeface="Cambria Math" panose="02040503050406030204" pitchFamily="18" charset="0"/>
-                          </a:rPr>
-                          <m:t>𝑧</m:t>
-                        </m:r>
-                      </m:e>
-                      <m:sub>
-                        <m:r>
-                          <a:rPr lang="en-US" b="0" i="1" smtClean="0">
-                            <a:latin typeface="Cambria Math" panose="02040503050406030204" pitchFamily="18" charset="0"/>
-                          </a:rPr>
-                          <m:t>𝑛</m:t>
-                        </m:r>
-                      </m:sub>
-                    </m:sSub>
-                  </m:oMath>
-                </a14:m>
-                <a:r>
-                  <a:rPr lang="en-US" dirty="0"/>
-                  <a:t>, define a statistic, </a:t>
-                </a:r>
-                <a14:m>
-                  <m:oMath xmlns:m="http://schemas.openxmlformats.org/officeDocument/2006/math">
-                    <m:r>
-                      <a:rPr lang="en-US" i="1">
-                        <a:latin typeface="Cambria Math" panose="02040503050406030204" pitchFamily="18" charset="0"/>
-                      </a:rPr>
-                      <m:t>𝑄</m:t>
-                    </m:r>
-                  </m:oMath>
-                </a14:m>
-                <a:r>
-                  <a:rPr lang="en-US" dirty="0"/>
-                  <a:t>, as the sum of squares:   </a:t>
-                </a:r>
-              </a:p>
-              <a:p>
-                <a:pPr marL="0" indent="0">
-                  <a:buNone/>
-                </a:pPr>
-                <a14:m>
-                  <m:oMathPara xmlns:m="http://schemas.openxmlformats.org/officeDocument/2006/math">
-                    <m:oMathParaPr>
-                      <m:jc m:val="centerGroup"/>
-                    </m:oMathParaPr>
-                    <m:oMath xmlns:m="http://schemas.openxmlformats.org/officeDocument/2006/math">
-                      <m:r>
-                        <a:rPr lang="en-US" b="0" i="1" smtClean="0">
-                          <a:latin typeface="Cambria Math" panose="02040503050406030204" pitchFamily="18" charset="0"/>
-                        </a:rPr>
-                        <m:t>𝑄</m:t>
-                      </m:r>
-                      <m:r>
-                        <a:rPr lang="en-US" b="0" i="1" smtClean="0">
-                          <a:latin typeface="Cambria Math" panose="02040503050406030204" pitchFamily="18" charset="0"/>
-                        </a:rPr>
-                        <m:t>=</m:t>
-                      </m:r>
-                      <m:nary>
-                        <m:naryPr>
-                          <m:chr m:val="∑"/>
-                          <m:ctrlPr>
-                            <a:rPr lang="en-US" b="0" i="1" smtClean="0">
-                              <a:latin typeface="Cambria Math" panose="02040503050406030204" pitchFamily="18" charset="0"/>
-                            </a:rPr>
-                          </m:ctrlPr>
-                        </m:naryPr>
-                        <m:sub>
-                          <m:r>
-                            <m:rPr>
-                              <m:brk m:alnAt="23"/>
-                            </m:rPr>
-                            <a:rPr lang="en-US" b="0" i="1" smtClean="0">
-                              <a:latin typeface="Cambria Math" panose="02040503050406030204" pitchFamily="18" charset="0"/>
-                            </a:rPr>
-                            <m:t>𝑖</m:t>
-                          </m:r>
-                          <m:r>
-                            <a:rPr lang="en-US" b="0" i="1" smtClean="0">
-                              <a:latin typeface="Cambria Math" panose="02040503050406030204" pitchFamily="18" charset="0"/>
-                            </a:rPr>
-                            <m:t>=</m:t>
-                          </m:r>
-                          <m:r>
-                            <m:rPr>
-                              <m:brk m:alnAt="23"/>
-                            </m:rPr>
-                            <a:rPr lang="en-US" b="0" i="1" smtClean="0">
-                              <a:latin typeface="Cambria Math" panose="02040503050406030204" pitchFamily="18" charset="0"/>
-                            </a:rPr>
-                            <m:t>1</m:t>
-                          </m:r>
-                        </m:sub>
-                        <m:sup>
-                          <m:r>
-                            <a:rPr lang="en-US" b="0" i="1" smtClean="0">
-                              <a:latin typeface="Cambria Math" panose="02040503050406030204" pitchFamily="18" charset="0"/>
-                            </a:rPr>
-                            <m:t>𝑛</m:t>
-                          </m:r>
-                        </m:sup>
-                        <m:e>
-                          <m:sSub>
-                            <m:sSubPr>
-                              <m:ctrlPr>
-                                <a:rPr lang="en-US" i="1">
-                                  <a:latin typeface="Cambria Math" panose="02040503050406030204" pitchFamily="18" charset="0"/>
-                                </a:rPr>
-                              </m:ctrlPr>
-                            </m:sSubPr>
-                            <m:e>
-                              <m:r>
-                                <a:rPr lang="en-US" i="1">
-                                  <a:latin typeface="Cambria Math" panose="02040503050406030204" pitchFamily="18" charset="0"/>
-                                </a:rPr>
-                                <m:t>𝑧</m:t>
-                              </m:r>
-                            </m:e>
-                            <m:sub>
-                              <m:r>
-                                <a:rPr lang="en-US" b="0" i="1" smtClean="0">
-                                  <a:latin typeface="Cambria Math" panose="02040503050406030204" pitchFamily="18" charset="0"/>
-                                </a:rPr>
-                                <m:t>𝑖</m:t>
-                              </m:r>
-                            </m:sub>
-                          </m:sSub>
-                        </m:e>
-                      </m:nary>
-                    </m:oMath>
-                  </m:oMathPara>
-                </a14:m>
-                <a:endParaRPr lang="en-US" dirty="0"/>
-              </a:p>
-              <a:p>
-                <a14:m>
-                  <m:oMath xmlns:m="http://schemas.openxmlformats.org/officeDocument/2006/math">
-                    <m:r>
-                      <a:rPr lang="en-US" b="0" i="1" smtClean="0">
-                        <a:latin typeface="Cambria Math" panose="02040503050406030204" pitchFamily="18" charset="0"/>
-                      </a:rPr>
-                      <m:t>𝑄</m:t>
-                    </m:r>
-                  </m:oMath>
-                </a14:m>
-                <a:r>
-                  <a:rPr lang="en-US" dirty="0"/>
-                  <a:t> is said to be </a:t>
-                </a:r>
-                <a14:m>
-                  <m:oMath xmlns:m="http://schemas.openxmlformats.org/officeDocument/2006/math">
-                    <m:sSubSup>
-                      <m:sSubSupPr>
-                        <m:ctrlPr>
-                          <a:rPr lang="en-US" b="1" i="1">
-                            <a:latin typeface="Cambria Math" panose="02040503050406030204" pitchFamily="18" charset="0"/>
-                          </a:rPr>
-                        </m:ctrlPr>
-                      </m:sSubSupPr>
-                      <m:e>
-                        <m:r>
-                          <a:rPr lang="en-US" b="1" i="1">
-                            <a:latin typeface="Cambria Math" panose="02040503050406030204" pitchFamily="18" charset="0"/>
-                          </a:rPr>
-                          <m:t>𝑿</m:t>
-                        </m:r>
-                      </m:e>
-                      <m:sub>
-                        <m:r>
-                          <a:rPr lang="en-US" b="1" i="1" smtClean="0">
-                            <a:latin typeface="Cambria Math" panose="02040503050406030204" pitchFamily="18" charset="0"/>
-                          </a:rPr>
-                          <m:t>𝒌</m:t>
-                        </m:r>
-                      </m:sub>
-                      <m:sup>
-                        <m:r>
-                          <a:rPr lang="en-US" b="1" i="1">
-                            <a:latin typeface="Cambria Math" panose="02040503050406030204" pitchFamily="18" charset="0"/>
-                          </a:rPr>
-                          <m:t>𝟐</m:t>
-                        </m:r>
-                      </m:sup>
-                    </m:sSubSup>
-                    <m:r>
-                      <a:rPr lang="en-US" b="1" i="1">
-                        <a:latin typeface="Cambria Math" panose="02040503050406030204" pitchFamily="18" charset="0"/>
-                      </a:rPr>
-                      <m:t> </m:t>
-                    </m:r>
-                  </m:oMath>
-                </a14:m>
-                <a:r>
-                  <a:rPr lang="en-US" b="1" dirty="0"/>
-                  <a:t>distributed </a:t>
-                </a:r>
-                <a:r>
-                  <a:rPr lang="en-US" dirty="0"/>
-                  <a:t>with </a:t>
-                </a:r>
-                <a14:m>
-                  <m:oMath xmlns:m="http://schemas.openxmlformats.org/officeDocument/2006/math">
-                    <m:r>
-                      <a:rPr lang="en-US" b="1" i="1">
-                        <a:latin typeface="Cambria Math" panose="02040503050406030204" pitchFamily="18" charset="0"/>
-                      </a:rPr>
-                      <m:t>𝒌</m:t>
-                    </m:r>
-                    <m:r>
-                      <a:rPr lang="en-US" b="1" i="1">
-                        <a:latin typeface="Cambria Math" panose="02040503050406030204" pitchFamily="18" charset="0"/>
-                      </a:rPr>
-                      <m:t>=</m:t>
-                    </m:r>
-                    <m:r>
-                      <a:rPr lang="en-US" b="1" i="1">
-                        <a:latin typeface="Cambria Math" panose="02040503050406030204" pitchFamily="18" charset="0"/>
-                      </a:rPr>
-                      <m:t>𝒏</m:t>
-                    </m:r>
-                    <m:r>
-                      <a:rPr lang="en-US" b="1" i="1" smtClean="0">
-                        <a:latin typeface="Cambria Math" panose="02040503050406030204" pitchFamily="18" charset="0"/>
-                      </a:rPr>
-                      <m:t>−</m:t>
-                    </m:r>
-                    <m:r>
-                      <a:rPr lang="en-US" b="1" i="1" smtClean="0">
-                        <a:latin typeface="Cambria Math" panose="02040503050406030204" pitchFamily="18" charset="0"/>
-                      </a:rPr>
-                      <m:t>𝟏</m:t>
-                    </m:r>
-                  </m:oMath>
-                </a14:m>
-                <a:r>
-                  <a:rPr lang="en-US" b="1" dirty="0"/>
-                  <a:t> degrees of freedom  </a:t>
-                </a:r>
-              </a:p>
-              <a:p>
-                <a:pPr marL="0" indent="0">
-                  <a:buNone/>
-                </a:pPr>
-                <a14:m>
-                  <m:oMathPara xmlns:m="http://schemas.openxmlformats.org/officeDocument/2006/math">
-                    <m:oMathParaPr>
-                      <m:jc m:val="centerGroup"/>
-                    </m:oMathParaPr>
-                    <m:oMath xmlns:m="http://schemas.openxmlformats.org/officeDocument/2006/math">
-                      <m:r>
-                        <a:rPr lang="en-US" b="0" i="1" smtClean="0">
-                          <a:latin typeface="Cambria Math" panose="02040503050406030204" pitchFamily="18" charset="0"/>
-                        </a:rPr>
-                        <m:t>𝑄</m:t>
-                      </m:r>
-                      <m:r>
-                        <a:rPr lang="en-US" b="0" i="1" smtClean="0">
-                          <a:latin typeface="Cambria Math" panose="02040503050406030204" pitchFamily="18" charset="0"/>
-                        </a:rPr>
-                        <m:t>=</m:t>
-                      </m:r>
-                      <m:sSup>
-                        <m:sSupPr>
-                          <m:ctrlPr>
-                            <a:rPr lang="en-US" i="1">
-                              <a:latin typeface="Cambria Math" panose="02040503050406030204" pitchFamily="18" charset="0"/>
-                            </a:rPr>
-                          </m:ctrlPr>
-                        </m:sSupPr>
-                        <m:e>
-                          <m:r>
-                            <m:rPr>
-                              <m:sty m:val="p"/>
-                            </m:rPr>
-                            <a:rPr lang="el-GR" i="1">
-                              <a:latin typeface="Cambria Math" panose="02040503050406030204" pitchFamily="18" charset="0"/>
-                              <a:ea typeface="Cambria Math" panose="02040503050406030204" pitchFamily="18" charset="0"/>
-                            </a:rPr>
-                            <m:t>Χ</m:t>
-                          </m:r>
-                        </m:e>
-                        <m:sup>
-                          <m:r>
-                            <a:rPr lang="en-US" i="1">
-                              <a:latin typeface="Cambria Math" panose="02040503050406030204" pitchFamily="18" charset="0"/>
-                            </a:rPr>
-                            <m:t>2</m:t>
-                          </m:r>
-                        </m:sup>
-                      </m:sSup>
-                      <m:r>
-                        <a:rPr lang="en-US" b="0" i="1" smtClean="0">
-                          <a:latin typeface="Cambria Math" panose="02040503050406030204" pitchFamily="18" charset="0"/>
-                        </a:rPr>
-                        <m:t>(</m:t>
-                      </m:r>
-                      <m:r>
-                        <a:rPr lang="en-US" b="0" i="1" smtClean="0">
-                          <a:latin typeface="Cambria Math" panose="02040503050406030204" pitchFamily="18" charset="0"/>
-                        </a:rPr>
-                        <m:t>𝑘</m:t>
-                      </m:r>
-                      <m:r>
-                        <a:rPr lang="en-US" b="0" i="1" smtClean="0">
-                          <a:latin typeface="Cambria Math" panose="02040503050406030204" pitchFamily="18" charset="0"/>
-                        </a:rPr>
-                        <m:t>)</m:t>
-                      </m:r>
-                    </m:oMath>
-                  </m:oMathPara>
-                </a14:m>
-                <a:endParaRPr lang="en-US" b="1" dirty="0"/>
-              </a:p>
-            </p:txBody>
-          </p:sp>
-        </mc:Choice>
-        <mc:Fallback xmlns="">
-          <p:sp>
-            <p:nvSpPr>
-              <p:cNvPr id="3" name="Content Placeholder 2"/>
-              <p:cNvSpPr>
-                <a:spLocks noGrp="1" noRot="1" noChangeAspect="1" noMove="1" noResize="1" noEditPoints="1" noAdjustHandles="1" noChangeArrowheads="1" noChangeShapeType="1" noTextEdit="1"/>
-              </p:cNvSpPr>
-              <p:nvPr>
-                <p:ph idx="1"/>
-              </p:nvPr>
-            </p:nvSpPr>
-            <p:spPr>
-              <a:blipFill>
-                <a:blip r:embed="rId3"/>
-                <a:stretch>
-                  <a:fillRect l="-963" t="-2154" r="-74"/>
-                </a:stretch>
-              </a:blipFill>
-            </p:spPr>
-            <p:txBody>
-              <a:bodyPr/>
-              <a:lstStyle/>
-              <a:p>
-                <a:r>
-                  <a:rPr lang="en-US">
-                    <a:noFill/>
-                  </a:rPr>
-                  <a:t> </a:t>
-                </a:r>
-              </a:p>
-            </p:txBody>
-          </p:sp>
-        </mc:Fallback>
-      </mc:AlternateContent>
-    </p:spTree>
-    <p:extLst>
-      <p:ext uri="{BB962C8B-B14F-4D97-AF65-F5344CB8AC3E}">
-        <p14:creationId xmlns:p14="http://schemas.microsoft.com/office/powerpoint/2010/main" val="642117844"/>
-      </p:ext>
-    </p:extLst>
-  </p:cSld>
-  <p:clrMapOvr>
-    <a:masterClrMapping/>
-  </p:clrMapOvr>
-</p:sld>
-</file>
-
-<file path=ppt/slides/slide42.xml><?xml version="1.0" encoding="utf-8"?>
-<p:sld xmlns:a="http://schemas.openxmlformats.org/drawingml/2006/main" xmlns:r="http://schemas.openxmlformats.org/officeDocument/2006/relationships" xmlns:p="http://schemas.openxmlformats.org/presentationml/2006/main">
-  <p:cSld>
-    <p:spTree>
-      <p:nvGrpSpPr>
-        <p:cNvPr id="1" name=""/>
-        <p:cNvGrpSpPr/>
-        <p:nvPr/>
-      </p:nvGrpSpPr>
-      <p:grpSpPr>
-        <a:xfrm>
-          <a:off x="0" y="0"/>
-          <a:ext cx="0" cy="0"/>
-          <a:chOff x="0" y="0"/>
-          <a:chExt cx="0" cy="0"/>
-        </a:xfrm>
-      </p:grpSpPr>
-      <mc:AlternateContent xmlns:mc="http://schemas.openxmlformats.org/markup-compatibility/2006" xmlns:a14="http://schemas.microsoft.com/office/drawing/2010/main">
-        <mc:Choice Requires="a14">
-          <p:sp>
-            <p:nvSpPr>
-              <p:cNvPr id="2" name="Title 1"/>
-              <p:cNvSpPr>
-                <a:spLocks noGrp="1"/>
-              </p:cNvSpPr>
-              <p:nvPr>
-                <p:ph type="title"/>
-              </p:nvPr>
-            </p:nvSpPr>
-            <p:spPr/>
-            <p:txBody>
-              <a:bodyPr/>
-              <a:lstStyle/>
-              <a:p>
-                <a:pPr marL="0" lvl="0" indent="0">
-                  <a:buNone/>
-                </a:pPr>
-                <a:r>
-                  <a:rPr lang="en-US" dirty="0"/>
-                  <a:t>The </a:t>
-                </a:r>
-                <a14:m>
-                  <m:oMath xmlns:m="http://schemas.openxmlformats.org/officeDocument/2006/math">
-                    <m:sSup>
-                      <m:sSupPr>
-                        <m:ctrlPr>
-                          <a:rPr lang="en-US" i="1" smtClean="0">
-                            <a:latin typeface="Cambria Math" panose="02040503050406030204" pitchFamily="18" charset="0"/>
-                          </a:rPr>
-                        </m:ctrlPr>
-                      </m:sSupPr>
-                      <m:e>
-                        <m:r>
-                          <m:rPr>
-                            <m:sty m:val="p"/>
-                          </m:rPr>
-                          <a:rPr lang="el-GR" i="1" smtClean="0">
-                            <a:latin typeface="Cambria Math" panose="02040503050406030204" pitchFamily="18" charset="0"/>
-                            <a:ea typeface="Cambria Math" panose="02040503050406030204" pitchFamily="18" charset="0"/>
-                          </a:rPr>
-                          <m:t>Χ</m:t>
-                        </m:r>
-                      </m:e>
-                      <m:sup>
-                        <m:r>
-                          <a:rPr lang="en-US" b="0" i="1" smtClean="0">
-                            <a:latin typeface="Cambria Math" panose="02040503050406030204" pitchFamily="18" charset="0"/>
-                          </a:rPr>
-                          <m:t>2</m:t>
-                        </m:r>
-                      </m:sup>
-                    </m:sSup>
-                  </m:oMath>
-                </a14:m>
-                <a:r>
-                  <a:rPr lang="en-US" dirty="0"/>
-                  <a:t>distribution</a:t>
-                </a:r>
-                <a:endParaRPr dirty="0"/>
-              </a:p>
-            </p:txBody>
-          </p:sp>
-        </mc:Choice>
-        <mc:Fallback xmlns="">
-          <p:sp>
-            <p:nvSpPr>
-              <p:cNvPr id="2" name="Title 1"/>
-              <p:cNvSpPr>
-                <a:spLocks noGrp="1" noRot="1" noChangeAspect="1" noMove="1" noResize="1" noEditPoints="1" noAdjustHandles="1" noChangeArrowheads="1" noChangeShapeType="1" noTextEdit="1"/>
-              </p:cNvSpPr>
-              <p:nvPr>
-                <p:ph type="title"/>
-              </p:nvPr>
-            </p:nvSpPr>
-            <p:spPr>
-              <a:blipFill>
-                <a:blip r:embed="rId2"/>
-                <a:stretch>
-                  <a:fillRect b="-10714"/>
-                </a:stretch>
-              </a:blipFill>
-            </p:spPr>
-            <p:txBody>
-              <a:bodyPr/>
-              <a:lstStyle/>
-              <a:p>
-                <a:r>
-                  <a:rPr lang="en-US">
-                    <a:noFill/>
-                  </a:rPr>
-                  <a:t> </a:t>
-                </a:r>
-              </a:p>
-            </p:txBody>
-          </p:sp>
-        </mc:Fallback>
-      </mc:AlternateContent>
-      <mc:AlternateContent xmlns:mc="http://schemas.openxmlformats.org/markup-compatibility/2006" xmlns:a14="http://schemas.microsoft.com/office/drawing/2010/main">
-        <mc:Choice Requires="a14">
-          <p:sp>
-            <p:nvSpPr>
-              <p:cNvPr id="3" name="Content Placeholder 2"/>
-              <p:cNvSpPr>
-                <a:spLocks noGrp="1"/>
-              </p:cNvSpPr>
-              <p:nvPr>
-                <p:ph idx="1"/>
-              </p:nvPr>
-            </p:nvSpPr>
             <p:spPr>
               <a:xfrm>
                 <a:off x="457200" y="1188334"/>
@@ -20664,7 +20028,7 @@
 </p:sld>
 </file>
 
-<file path=ppt/slides/slide43.xml><?xml version="1.0" encoding="utf-8"?>
+<file path=ppt/slides/slide42.xml><?xml version="1.0" encoding="utf-8"?>
 <p:sld xmlns:a="http://schemas.openxmlformats.org/drawingml/2006/main" xmlns:r="http://schemas.openxmlformats.org/officeDocument/2006/relationships" xmlns:p="http://schemas.openxmlformats.org/presentationml/2006/main">
   <p:cSld>
     <p:spTree>
@@ -20781,8 +20145,8 @@
           </p:sp>
         </mc:Fallback>
       </mc:AlternateContent>
-      <mc:AlternateContent xmlns:mc="http://schemas.openxmlformats.org/markup-compatibility/2006" xmlns:a14="http://schemas.microsoft.com/office/drawing/2010/main">
-        <mc:Choice Requires="a14">
+      <mc:AlternateContent xmlns:mc="http://schemas.openxmlformats.org/markup-compatibility/2006">
+        <mc:Choice xmlns:a14="http://schemas.microsoft.com/office/drawing/2010/main" Requires="a14">
           <p:sp>
             <p:nvSpPr>
               <p:cNvPr id="3" name="Content Placeholder 2"/>
@@ -20878,14 +20242,42 @@
                 </a:r>
                 <a:r>
                   <a:rPr lang="en-US" dirty="0"/>
-                  <a:t> values the density starts at 0 and rises to a maximum or mode and then decay back toward 0 </a:t>
+                  <a:t> values, </a:t>
+                </a:r>
+                <a14:m>
+                  <m:oMath xmlns:m="http://schemas.openxmlformats.org/officeDocument/2006/math">
+                    <m:r>
+                      <a:rPr lang="en-US" b="0" i="1" smtClean="0">
+                        <a:latin typeface="Cambria Math" panose="02040503050406030204" pitchFamily="18" charset="0"/>
+                      </a:rPr>
+                      <m:t>𝑘</m:t>
+                    </m:r>
+                    <m:r>
+                      <a:rPr lang="en-US" b="0" i="1" smtClean="0">
+                        <a:latin typeface="Cambria Math" panose="02040503050406030204" pitchFamily="18" charset="0"/>
+                        <a:ea typeface="Cambria Math" panose="02040503050406030204" pitchFamily="18" charset="0"/>
+                      </a:rPr>
+                      <m:t>&gt;</m:t>
+                    </m:r>
+                    <m:r>
+                      <a:rPr lang="en-US" b="0" i="1" smtClean="0">
+                        <a:latin typeface="Cambria Math" panose="02040503050406030204" pitchFamily="18" charset="0"/>
+                        <a:ea typeface="Cambria Math" panose="02040503050406030204" pitchFamily="18" charset="0"/>
+                      </a:rPr>
+                      <m:t>2</m:t>
+                    </m:r>
+                  </m:oMath>
+                </a14:m>
+                <a:r>
+                  <a:rPr lang="en-US" dirty="0"/>
+                  <a:t>, the density starts at 0, rises to a maximum or mode and then decays toward 0 </a:t>
                 </a:r>
                 <a:endParaRPr dirty="0"/>
               </a:p>
             </p:txBody>
           </p:sp>
         </mc:Choice>
-        <mc:Fallback xmlns="">
+        <mc:Fallback>
           <p:sp>
             <p:nvSpPr>
               <p:cNvPr id="3" name="Content Placeholder 2"/>
@@ -20904,7 +20296,7 @@
               <a:blipFill>
                 <a:blip r:embed="rId3"/>
                 <a:stretch>
-                  <a:fillRect l="-3110" t="-2222" r="-3828" b="-855"/>
+                  <a:fillRect l="-3110" t="-2222" r="-1914" b="-855"/>
                 </a:stretch>
               </a:blipFill>
             </p:spPr>
@@ -20966,7 +20358,7 @@
 </p:sld>
 </file>
 
-<file path=ppt/slides/slide44.xml><?xml version="1.0" encoding="utf-8"?>
+<file path=ppt/slides/slide43.xml><?xml version="1.0" encoding="utf-8"?>
 <p:sld xmlns:a="http://schemas.openxmlformats.org/drawingml/2006/main" xmlns:r="http://schemas.openxmlformats.org/officeDocument/2006/relationships" xmlns:p="http://schemas.openxmlformats.org/presentationml/2006/main">
   <p:cSld>
     <p:spTree>
@@ -21312,7 +20704,7 @@
 </p:sld>
 </file>
 
-<file path=ppt/slides/slide45.xml><?xml version="1.0" encoding="utf-8"?>
+<file path=ppt/slides/slide44.xml><?xml version="1.0" encoding="utf-8"?>
 <p:sld xmlns:a="http://schemas.openxmlformats.org/drawingml/2006/main" xmlns:r="http://schemas.openxmlformats.org/officeDocument/2006/relationships" xmlns:p="http://schemas.openxmlformats.org/presentationml/2006/main">
   <p:cSld>
     <p:spTree>
@@ -21509,7 +20901,7 @@
 </p:sld>
 </file>
 
-<file path=ppt/slides/slide46.xml><?xml version="1.0" encoding="utf-8"?>
+<file path=ppt/slides/slide45.xml><?xml version="1.0" encoding="utf-8"?>
 <p:sld xmlns:a="http://schemas.openxmlformats.org/drawingml/2006/main" xmlns:r="http://schemas.openxmlformats.org/officeDocument/2006/relationships" xmlns:p="http://schemas.openxmlformats.org/presentationml/2006/main">
   <p:cSld>
     <p:spTree>
@@ -21545,6 +20937,7 @@
               <a:buNone/>
             </a:pPr>
             <a:r>
+              <a:rPr dirty="0"/>
               <a:t>Odds</a:t>
             </a:r>
           </a:p>
@@ -22332,7 +21725,7 @@
 </p:sld>
 </file>
 
-<file path=ppt/slides/slide47.xml><?xml version="1.0" encoding="utf-8"?>
+<file path=ppt/slides/slide46.xml><?xml version="1.0" encoding="utf-8"?>
 <p:sld xmlns:a="http://schemas.openxmlformats.org/drawingml/2006/main" xmlns:r="http://schemas.openxmlformats.org/officeDocument/2006/relationships" xmlns:p="http://schemas.openxmlformats.org/presentationml/2006/main">
   <p:cSld>
     <p:spTree>
@@ -22981,7 +22374,7 @@
 </p:sld>
 </file>
 
-<file path=ppt/slides/slide48.xml><?xml version="1.0" encoding="utf-8"?>
+<file path=ppt/slides/slide47.xml><?xml version="1.0" encoding="utf-8"?>
 <p:sld xmlns:a="http://schemas.openxmlformats.org/drawingml/2006/main" xmlns:r="http://schemas.openxmlformats.org/officeDocument/2006/relationships" xmlns:p="http://schemas.openxmlformats.org/presentationml/2006/main">
   <p:cSld>
     <p:spTree>
@@ -23022,8 +22415,8 @@
           </a:p>
         </p:txBody>
       </p:sp>
-      <mc:AlternateContent xmlns:mc="http://schemas.openxmlformats.org/markup-compatibility/2006">
-        <mc:Choice xmlns:a14="http://schemas.microsoft.com/office/drawing/2010/main" Requires="a14">
+      <mc:AlternateContent xmlns:mc="http://schemas.openxmlformats.org/markup-compatibility/2006" xmlns:a14="http://schemas.microsoft.com/office/drawing/2010/main">
+        <mc:Choice Requires="a14">
           <p:sp>
             <p:nvSpPr>
               <p:cNvPr id="3" name="Content Placeholder 2"/>
@@ -23841,7 +23234,7 @@
             </p:txBody>
           </p:sp>
         </mc:Choice>
-        <mc:Fallback>
+        <mc:Fallback xmlns="">
           <p:sp>
             <p:nvSpPr>
               <p:cNvPr id="3" name="Content Placeholder 2"/>
@@ -25743,7 +25136,13 @@
                         <a:rPr>
                           <a:latin typeface="Cambria Math" panose="02040503050406030204" pitchFamily="18" charset="0"/>
                         </a:rPr>
-                        <m:t>0≤</m:t>
+                        <m:t>0</m:t>
+                      </m:r>
+                      <m:r>
+                        <a:rPr>
+                          <a:latin typeface="Cambria Math" panose="02040503050406030204" pitchFamily="18" charset="0"/>
+                        </a:rPr>
+                        <m:t>≤</m:t>
                       </m:r>
                       <m:nary>
                         <m:naryPr>
@@ -25844,7 +25243,13 @@
                         <a:rPr>
                           <a:latin typeface="Cambria Math" panose="02040503050406030204" pitchFamily="18" charset="0"/>
                         </a:rPr>
-                        <m:t> ≤1</m:t>
+                        <m:t> ≤</m:t>
+                      </m:r>
+                      <m:r>
+                        <a:rPr>
+                          <a:latin typeface="Cambria Math" panose="02040503050406030204" pitchFamily="18" charset="0"/>
+                        </a:rPr>
+                        <m:t>1</m:t>
                       </m:r>
                     </m:oMath>
                   </m:oMathPara>
@@ -26008,7 +25413,13 @@
                         <a:rPr>
                           <a:latin typeface="Cambria Math" panose="02040503050406030204" pitchFamily="18" charset="0"/>
                         </a:rPr>
-                        <m:t>=1</m:t>
+                        <m:t>=</m:t>
+                      </m:r>
+                      <m:r>
+                        <a:rPr>
+                          <a:latin typeface="Cambria Math" panose="02040503050406030204" pitchFamily="18" charset="0"/>
+                        </a:rPr>
+                        <m:t>1</m:t>
                       </m:r>
                     </m:oMath>
                   </m:oMathPara>
@@ -26047,7 +25458,13 @@
                       <a:rPr>
                         <a:latin typeface="Cambria Math" panose="02040503050406030204" pitchFamily="18" charset="0"/>
                       </a:rPr>
-                      <m:t>−∞</m:t>
+                      <m:t>−</m:t>
+                    </m:r>
+                    <m:r>
+                      <a:rPr>
+                        <a:latin typeface="Cambria Math" panose="02040503050406030204" pitchFamily="18" charset="0"/>
+                      </a:rPr>
+                      <m:t>∞</m:t>
                     </m:r>
                   </m:oMath>
                 </a14:m>

</xml_diff>